<commit_message>
Java Sir Notes- Juned Alam Sir
</commit_message>
<xml_diff>
--- a/sem7/AJP/Java Servlet web application.pptx
+++ b/sem7/AJP/Java Servlet web application.pptx
@@ -228,7 +228,7 @@
           <a:p>
             <a:fld id="{2B85766F-5EC0-4797-B4D1-777FCB005B11}" type="datetimeFigureOut">
               <a:rPr lang="en-US" smtClean="0"/>
-              <a:t>11/24/2021</a:t>
+              <a:t>12/30/2021</a:t>
             </a:fld>
             <a:endParaRPr lang="en-US" dirty="0"/>
           </a:p>
@@ -405,7 +405,7 @@
           <a:p>
             <a:fld id="{B2B4B5EC-152C-4627-80C0-63B10D5574EF}" type="datetimeFigureOut">
               <a:rPr lang="en-US" smtClean="0"/>
-              <a:t>11/24/2021</a:t>
+              <a:t>12/30/2021</a:t>
             </a:fld>
             <a:endParaRPr lang="en-US" dirty="0"/>
           </a:p>
@@ -729,7 +729,7 @@
           <a:noFill/>
           <a:extLst>
             <a:ext uri="{909E8E84-426E-40dd-AFC4-6F175D3DCCD1}">
-              <a14:hiddenFill xmlns="" xmlns:a14="http://schemas.microsoft.com/office/drawing/2010/main">
+              <a14:hiddenFill xmlns:a14="http://schemas.microsoft.com/office/drawing/2010/main" xmlns="">
                 <a:solidFill>
                   <a:srgbClr val="FFFFFF"/>
                 </a:solidFill>
@@ -788,7 +788,7 @@
             </a:ln>
             <a:extLst>
               <a:ext uri="{91240B29-F687-4f45-9708-019B960494DF}">
-                <a14:hiddenLine xmlns="" xmlns:a14="http://schemas.microsoft.com/office/drawing/2010/main" w="9525">
+                <a14:hiddenLine xmlns:a14="http://schemas.microsoft.com/office/drawing/2010/main" xmlns="" w="9525">
                   <a:solidFill>
                     <a:srgbClr val="000000"/>
                   </a:solidFill>
@@ -878,7 +878,7 @@
             </a:ln>
             <a:extLst>
               <a:ext uri="{91240B29-F687-4f45-9708-019B960494DF}">
-                <a14:hiddenLine xmlns="" xmlns:a14="http://schemas.microsoft.com/office/drawing/2010/main" w="9525">
+                <a14:hiddenLine xmlns:a14="http://schemas.microsoft.com/office/drawing/2010/main" xmlns="" w="9525">
                   <a:solidFill>
                     <a:srgbClr val="000000"/>
                   </a:solidFill>
@@ -968,7 +968,7 @@
             </a:ln>
             <a:extLst>
               <a:ext uri="{91240B29-F687-4f45-9708-019B960494DF}">
-                <a14:hiddenLine xmlns="" xmlns:a14="http://schemas.microsoft.com/office/drawing/2010/main" w="9525">
+                <a14:hiddenLine xmlns:a14="http://schemas.microsoft.com/office/drawing/2010/main" xmlns="" w="9525">
                   <a:solidFill>
                     <a:srgbClr val="000000"/>
                   </a:solidFill>
@@ -1002,7 +1002,7 @@
             </a:ln>
             <a:extLst>
               <a:ext uri="{91240B29-F687-4f45-9708-019B960494DF}">
-                <a14:hiddenLine xmlns="" xmlns:a14="http://schemas.microsoft.com/office/drawing/2010/main" w="9525">
+                <a14:hiddenLine xmlns:a14="http://schemas.microsoft.com/office/drawing/2010/main" xmlns="" w="9525">
                   <a:solidFill>
                     <a:srgbClr val="000000"/>
                   </a:solidFill>
@@ -1092,7 +1092,7 @@
             </a:ln>
             <a:extLst>
               <a:ext uri="{91240B29-F687-4f45-9708-019B960494DF}">
-                <a14:hiddenLine xmlns="" xmlns:a14="http://schemas.microsoft.com/office/drawing/2010/main" w="9525">
+                <a14:hiddenLine xmlns:a14="http://schemas.microsoft.com/office/drawing/2010/main" xmlns="" w="9525">
                   <a:solidFill>
                     <a:srgbClr val="000000"/>
                   </a:solidFill>
@@ -1154,7 +1154,7 @@
             </a:ln>
             <a:extLst>
               <a:ext uri="{91240B29-F687-4f45-9708-019B960494DF}">
-                <a14:hiddenLine xmlns="" xmlns:a14="http://schemas.microsoft.com/office/drawing/2010/main" w="9525">
+                <a14:hiddenLine xmlns:a14="http://schemas.microsoft.com/office/drawing/2010/main" xmlns="" w="9525">
                   <a:solidFill>
                     <a:srgbClr val="000000"/>
                   </a:solidFill>
@@ -1216,7 +1216,7 @@
             </a:ln>
             <a:extLst>
               <a:ext uri="{91240B29-F687-4f45-9708-019B960494DF}">
-                <a14:hiddenLine xmlns="" xmlns:a14="http://schemas.microsoft.com/office/drawing/2010/main" w="9525">
+                <a14:hiddenLine xmlns:a14="http://schemas.microsoft.com/office/drawing/2010/main" xmlns="" w="9525">
                   <a:solidFill>
                     <a:srgbClr val="000000"/>
                   </a:solidFill>
@@ -1306,7 +1306,7 @@
             </a:ln>
             <a:extLst>
               <a:ext uri="{91240B29-F687-4f45-9708-019B960494DF}">
-                <a14:hiddenLine xmlns="" xmlns:a14="http://schemas.microsoft.com/office/drawing/2010/main" w="9525">
+                <a14:hiddenLine xmlns:a14="http://schemas.microsoft.com/office/drawing/2010/main" xmlns="" w="9525">
                   <a:solidFill>
                     <a:srgbClr val="000000"/>
                   </a:solidFill>
@@ -1368,7 +1368,7 @@
             </a:ln>
             <a:extLst>
               <a:ext uri="{91240B29-F687-4f45-9708-019B960494DF}">
-                <a14:hiddenLine xmlns="" xmlns:a14="http://schemas.microsoft.com/office/drawing/2010/main" w="9525">
+                <a14:hiddenLine xmlns:a14="http://schemas.microsoft.com/office/drawing/2010/main" xmlns="" w="9525">
                   <a:solidFill>
                     <a:srgbClr val="000000"/>
                   </a:solidFill>
@@ -1430,7 +1430,7 @@
             </a:ln>
             <a:extLst>
               <a:ext uri="{91240B29-F687-4f45-9708-019B960494DF}">
-                <a14:hiddenLine xmlns="" xmlns:a14="http://schemas.microsoft.com/office/drawing/2010/main" w="9525">
+                <a14:hiddenLine xmlns:a14="http://schemas.microsoft.com/office/drawing/2010/main" xmlns="" w="9525">
                   <a:solidFill>
                     <a:srgbClr val="000000"/>
                   </a:solidFill>
@@ -1520,7 +1520,7 @@
             </a:ln>
             <a:extLst>
               <a:ext uri="{91240B29-F687-4f45-9708-019B960494DF}">
-                <a14:hiddenLine xmlns="" xmlns:a14="http://schemas.microsoft.com/office/drawing/2010/main" w="9525">
+                <a14:hiddenLine xmlns:a14="http://schemas.microsoft.com/office/drawing/2010/main" xmlns="" w="9525">
                   <a:solidFill>
                     <a:srgbClr val="000000"/>
                   </a:solidFill>
@@ -1610,7 +1610,7 @@
             </a:ln>
             <a:extLst>
               <a:ext uri="{91240B29-F687-4f45-9708-019B960494DF}">
-                <a14:hiddenLine xmlns="" xmlns:a14="http://schemas.microsoft.com/office/drawing/2010/main" w="9525">
+                <a14:hiddenLine xmlns:a14="http://schemas.microsoft.com/office/drawing/2010/main" xmlns="" w="9525">
                   <a:solidFill>
                     <a:srgbClr val="000000"/>
                   </a:solidFill>
@@ -1672,7 +1672,7 @@
             </a:ln>
             <a:extLst>
               <a:ext uri="{91240B29-F687-4f45-9708-019B960494DF}">
-                <a14:hiddenLine xmlns="" xmlns:a14="http://schemas.microsoft.com/office/drawing/2010/main" w="9525">
+                <a14:hiddenLine xmlns:a14="http://schemas.microsoft.com/office/drawing/2010/main" xmlns="" w="9525">
                   <a:solidFill>
                     <a:srgbClr val="000000"/>
                   </a:solidFill>
@@ -1782,7 +1782,7 @@
             </a:ln>
             <a:extLst>
               <a:ext uri="{91240B29-F687-4f45-9708-019B960494DF}">
-                <a14:hiddenLine xmlns="" xmlns:a14="http://schemas.microsoft.com/office/drawing/2010/main" w="9525">
+                <a14:hiddenLine xmlns:a14="http://schemas.microsoft.com/office/drawing/2010/main" xmlns="" w="9525">
                   <a:solidFill>
                     <a:srgbClr val="000000"/>
                   </a:solidFill>
@@ -1844,7 +1844,7 @@
             </a:ln>
             <a:extLst>
               <a:ext uri="{91240B29-F687-4f45-9708-019B960494DF}">
-                <a14:hiddenLine xmlns="" xmlns:a14="http://schemas.microsoft.com/office/drawing/2010/main" w="9525">
+                <a14:hiddenLine xmlns:a14="http://schemas.microsoft.com/office/drawing/2010/main" xmlns="" w="9525">
                   <a:solidFill>
                     <a:srgbClr val="000000"/>
                   </a:solidFill>
@@ -1934,7 +1934,7 @@
             </a:ln>
             <a:extLst>
               <a:ext uri="{91240B29-F687-4f45-9708-019B960494DF}">
-                <a14:hiddenLine xmlns="" xmlns:a14="http://schemas.microsoft.com/office/drawing/2010/main" w="9525">
+                <a14:hiddenLine xmlns:a14="http://schemas.microsoft.com/office/drawing/2010/main" xmlns="" w="9525">
                   <a:solidFill>
                     <a:srgbClr val="000000"/>
                   </a:solidFill>
@@ -2024,7 +2024,7 @@
             </a:ln>
             <a:extLst>
               <a:ext uri="{91240B29-F687-4f45-9708-019B960494DF}">
-                <a14:hiddenLine xmlns="" xmlns:a14="http://schemas.microsoft.com/office/drawing/2010/main" w="9525">
+                <a14:hiddenLine xmlns:a14="http://schemas.microsoft.com/office/drawing/2010/main" xmlns="" w="9525">
                   <a:solidFill>
                     <a:srgbClr val="000000"/>
                   </a:solidFill>
@@ -2086,7 +2086,7 @@
             </a:ln>
             <a:extLst>
               <a:ext uri="{91240B29-F687-4f45-9708-019B960494DF}">
-                <a14:hiddenLine xmlns="" xmlns:a14="http://schemas.microsoft.com/office/drawing/2010/main" w="9525">
+                <a14:hiddenLine xmlns:a14="http://schemas.microsoft.com/office/drawing/2010/main" xmlns="" w="9525">
                   <a:solidFill>
                     <a:srgbClr val="000000"/>
                   </a:solidFill>
@@ -2176,7 +2176,7 @@
             </a:ln>
             <a:extLst>
               <a:ext uri="{91240B29-F687-4f45-9708-019B960494DF}">
-                <a14:hiddenLine xmlns="" xmlns:a14="http://schemas.microsoft.com/office/drawing/2010/main" w="9525">
+                <a14:hiddenLine xmlns:a14="http://schemas.microsoft.com/office/drawing/2010/main" xmlns="" w="9525">
                   <a:solidFill>
                     <a:srgbClr val="000000"/>
                   </a:solidFill>
@@ -2266,7 +2266,7 @@
             </a:ln>
             <a:extLst>
               <a:ext uri="{91240B29-F687-4f45-9708-019B960494DF}">
-                <a14:hiddenLine xmlns="" xmlns:a14="http://schemas.microsoft.com/office/drawing/2010/main" w="9525">
+                <a14:hiddenLine xmlns:a14="http://schemas.microsoft.com/office/drawing/2010/main" xmlns="" w="9525">
                   <a:solidFill>
                     <a:srgbClr val="000000"/>
                   </a:solidFill>
@@ -2322,7 +2322,7 @@
             </a:ln>
             <a:extLst>
               <a:ext uri="{91240B29-F687-4f45-9708-019B960494DF}">
-                <a14:hiddenLine xmlns="" xmlns:a14="http://schemas.microsoft.com/office/drawing/2010/main" w="9525">
+                <a14:hiddenLine xmlns:a14="http://schemas.microsoft.com/office/drawing/2010/main" xmlns="" w="9525">
                   <a:solidFill>
                     <a:srgbClr val="000000"/>
                   </a:solidFill>
@@ -2412,7 +2412,7 @@
             </a:ln>
             <a:extLst>
               <a:ext uri="{91240B29-F687-4f45-9708-019B960494DF}">
-                <a14:hiddenLine xmlns="" xmlns:a14="http://schemas.microsoft.com/office/drawing/2010/main" w="9525">
+                <a14:hiddenLine xmlns:a14="http://schemas.microsoft.com/office/drawing/2010/main" xmlns="" w="9525">
                   <a:solidFill>
                     <a:srgbClr val="000000"/>
                   </a:solidFill>
@@ -2468,7 +2468,7 @@
             </a:ln>
             <a:extLst>
               <a:ext uri="{91240B29-F687-4f45-9708-019B960494DF}">
-                <a14:hiddenLine xmlns="" xmlns:a14="http://schemas.microsoft.com/office/drawing/2010/main" w="9525">
+                <a14:hiddenLine xmlns:a14="http://schemas.microsoft.com/office/drawing/2010/main" xmlns="" w="9525">
                   <a:solidFill>
                     <a:srgbClr val="000000"/>
                   </a:solidFill>
@@ -2558,7 +2558,7 @@
             </a:ln>
             <a:extLst>
               <a:ext uri="{91240B29-F687-4f45-9708-019B960494DF}">
-                <a14:hiddenLine xmlns="" xmlns:a14="http://schemas.microsoft.com/office/drawing/2010/main" w="9525">
+                <a14:hiddenLine xmlns:a14="http://schemas.microsoft.com/office/drawing/2010/main" xmlns="" w="9525">
                   <a:solidFill>
                     <a:srgbClr val="000000"/>
                   </a:solidFill>
@@ -2626,7 +2626,7 @@
             </a:ln>
             <a:extLst>
               <a:ext uri="{91240B29-F687-4f45-9708-019B960494DF}">
-                <a14:hiddenLine xmlns="" xmlns:a14="http://schemas.microsoft.com/office/drawing/2010/main" w="9525">
+                <a14:hiddenLine xmlns:a14="http://schemas.microsoft.com/office/drawing/2010/main" xmlns="" w="9525">
                   <a:solidFill>
                     <a:srgbClr val="000000"/>
                   </a:solidFill>
@@ -2716,7 +2716,7 @@
             </a:ln>
             <a:extLst>
               <a:ext uri="{91240B29-F687-4f45-9708-019B960494DF}">
-                <a14:hiddenLine xmlns="" xmlns:a14="http://schemas.microsoft.com/office/drawing/2010/main" w="9525">
+                <a14:hiddenLine xmlns:a14="http://schemas.microsoft.com/office/drawing/2010/main" xmlns="" w="9525">
                   <a:solidFill>
                     <a:srgbClr val="000000"/>
                   </a:solidFill>
@@ -2784,7 +2784,7 @@
             </a:ln>
             <a:extLst>
               <a:ext uri="{91240B29-F687-4f45-9708-019B960494DF}">
-                <a14:hiddenLine xmlns="" xmlns:a14="http://schemas.microsoft.com/office/drawing/2010/main" w="9525">
+                <a14:hiddenLine xmlns:a14="http://schemas.microsoft.com/office/drawing/2010/main" xmlns="" w="9525">
                   <a:solidFill>
                     <a:srgbClr val="000000"/>
                   </a:solidFill>
@@ -2874,7 +2874,7 @@
             </a:ln>
             <a:extLst>
               <a:ext uri="{91240B29-F687-4f45-9708-019B960494DF}">
-                <a14:hiddenLine xmlns="" xmlns:a14="http://schemas.microsoft.com/office/drawing/2010/main" w="9525">
+                <a14:hiddenLine xmlns:a14="http://schemas.microsoft.com/office/drawing/2010/main" xmlns="" w="9525">
                   <a:solidFill>
                     <a:srgbClr val="000000"/>
                   </a:solidFill>
@@ -2908,7 +2908,7 @@
             </a:ln>
             <a:extLst>
               <a:ext uri="{91240B29-F687-4f45-9708-019B960494DF}">
-                <a14:hiddenLine xmlns="" xmlns:a14="http://schemas.microsoft.com/office/drawing/2010/main" w="9525">
+                <a14:hiddenLine xmlns:a14="http://schemas.microsoft.com/office/drawing/2010/main" xmlns="" w="9525">
                   <a:solidFill>
                     <a:srgbClr val="000000"/>
                   </a:solidFill>
@@ -2998,7 +2998,7 @@
             </a:ln>
             <a:extLst>
               <a:ext uri="{91240B29-F687-4f45-9708-019B960494DF}">
-                <a14:hiddenLine xmlns="" xmlns:a14="http://schemas.microsoft.com/office/drawing/2010/main" w="9525">
+                <a14:hiddenLine xmlns:a14="http://schemas.microsoft.com/office/drawing/2010/main" xmlns="" w="9525">
                   <a:solidFill>
                     <a:srgbClr val="000000"/>
                   </a:solidFill>
@@ -3060,7 +3060,7 @@
             </a:ln>
             <a:extLst>
               <a:ext uri="{91240B29-F687-4f45-9708-019B960494DF}">
-                <a14:hiddenLine xmlns="" xmlns:a14="http://schemas.microsoft.com/office/drawing/2010/main" w="9525">
+                <a14:hiddenLine xmlns:a14="http://schemas.microsoft.com/office/drawing/2010/main" xmlns="" w="9525">
                   <a:solidFill>
                     <a:srgbClr val="000000"/>
                   </a:solidFill>
@@ -3122,7 +3122,7 @@
             </a:ln>
             <a:extLst>
               <a:ext uri="{91240B29-F687-4f45-9708-019B960494DF}">
-                <a14:hiddenLine xmlns="" xmlns:a14="http://schemas.microsoft.com/office/drawing/2010/main" w="9525">
+                <a14:hiddenLine xmlns:a14="http://schemas.microsoft.com/office/drawing/2010/main" xmlns="" w="9525">
                   <a:solidFill>
                     <a:srgbClr val="000000"/>
                   </a:solidFill>
@@ -3212,7 +3212,7 @@
             </a:ln>
             <a:extLst>
               <a:ext uri="{91240B29-F687-4f45-9708-019B960494DF}">
-                <a14:hiddenLine xmlns="" xmlns:a14="http://schemas.microsoft.com/office/drawing/2010/main" w="9525">
+                <a14:hiddenLine xmlns:a14="http://schemas.microsoft.com/office/drawing/2010/main" xmlns="" w="9525">
                   <a:solidFill>
                     <a:srgbClr val="000000"/>
                   </a:solidFill>
@@ -3280,7 +3280,7 @@
             </a:ln>
             <a:extLst>
               <a:ext uri="{91240B29-F687-4f45-9708-019B960494DF}">
-                <a14:hiddenLine xmlns="" xmlns:a14="http://schemas.microsoft.com/office/drawing/2010/main" w="9525">
+                <a14:hiddenLine xmlns:a14="http://schemas.microsoft.com/office/drawing/2010/main" xmlns="" w="9525">
                   <a:solidFill>
                     <a:srgbClr val="000000"/>
                   </a:solidFill>
@@ -3342,7 +3342,7 @@
             </a:ln>
             <a:extLst>
               <a:ext uri="{91240B29-F687-4f45-9708-019B960494DF}">
-                <a14:hiddenLine xmlns="" xmlns:a14="http://schemas.microsoft.com/office/drawing/2010/main" w="9525">
+                <a14:hiddenLine xmlns:a14="http://schemas.microsoft.com/office/drawing/2010/main" xmlns="" w="9525">
                   <a:solidFill>
                     <a:srgbClr val="000000"/>
                   </a:solidFill>
@@ -3432,7 +3432,7 @@
             </a:ln>
             <a:extLst>
               <a:ext uri="{91240B29-F687-4f45-9708-019B960494DF}">
-                <a14:hiddenLine xmlns="" xmlns:a14="http://schemas.microsoft.com/office/drawing/2010/main" w="9525">
+                <a14:hiddenLine xmlns:a14="http://schemas.microsoft.com/office/drawing/2010/main" xmlns="" w="9525">
                   <a:solidFill>
                     <a:srgbClr val="000000"/>
                   </a:solidFill>
@@ -3494,7 +3494,7 @@
             </a:ln>
             <a:extLst>
               <a:ext uri="{91240B29-F687-4f45-9708-019B960494DF}">
-                <a14:hiddenLine xmlns="" xmlns:a14="http://schemas.microsoft.com/office/drawing/2010/main" w="9525">
+                <a14:hiddenLine xmlns:a14="http://schemas.microsoft.com/office/drawing/2010/main" xmlns="" w="9525">
                   <a:solidFill>
                     <a:srgbClr val="000000"/>
                   </a:solidFill>
@@ -3584,7 +3584,7 @@
             </a:ln>
             <a:extLst>
               <a:ext uri="{91240B29-F687-4f45-9708-019B960494DF}">
-                <a14:hiddenLine xmlns="" xmlns:a14="http://schemas.microsoft.com/office/drawing/2010/main" w="9525">
+                <a14:hiddenLine xmlns:a14="http://schemas.microsoft.com/office/drawing/2010/main" xmlns="" w="9525">
                   <a:solidFill>
                     <a:srgbClr val="000000"/>
                   </a:solidFill>
@@ -3646,7 +3646,7 @@
             </a:ln>
             <a:extLst>
               <a:ext uri="{91240B29-F687-4f45-9708-019B960494DF}">
-                <a14:hiddenLine xmlns="" xmlns:a14="http://schemas.microsoft.com/office/drawing/2010/main" w="9525">
+                <a14:hiddenLine xmlns:a14="http://schemas.microsoft.com/office/drawing/2010/main" xmlns="" w="9525">
                   <a:solidFill>
                     <a:srgbClr val="000000"/>
                   </a:solidFill>
@@ -3736,7 +3736,7 @@
             </a:ln>
             <a:extLst>
               <a:ext uri="{91240B29-F687-4f45-9708-019B960494DF}">
-                <a14:hiddenLine xmlns="" xmlns:a14="http://schemas.microsoft.com/office/drawing/2010/main" w="9525">
+                <a14:hiddenLine xmlns:a14="http://schemas.microsoft.com/office/drawing/2010/main" xmlns="" w="9525">
                   <a:solidFill>
                     <a:srgbClr val="000000"/>
                   </a:solidFill>
@@ -3770,7 +3770,7 @@
             </a:ln>
             <a:extLst>
               <a:ext uri="{91240B29-F687-4f45-9708-019B960494DF}">
-                <a14:hiddenLine xmlns="" xmlns:a14="http://schemas.microsoft.com/office/drawing/2010/main" w="9525">
+                <a14:hiddenLine xmlns:a14="http://schemas.microsoft.com/office/drawing/2010/main" xmlns="" w="9525">
                   <a:solidFill>
                     <a:srgbClr val="000000"/>
                   </a:solidFill>
@@ -3835,7 +3835,7 @@
             </a:ln>
             <a:extLst>
               <a:ext uri="{91240B29-F687-4f45-9708-019B960494DF}">
-                <a14:hiddenLine xmlns="" xmlns:a14="http://schemas.microsoft.com/office/drawing/2010/main" w="9525">
+                <a14:hiddenLine xmlns:a14="http://schemas.microsoft.com/office/drawing/2010/main" xmlns="" w="9525">
                   <a:solidFill>
                     <a:srgbClr val="000000"/>
                   </a:solidFill>
@@ -3925,7 +3925,7 @@
             </a:ln>
             <a:extLst>
               <a:ext uri="{91240B29-F687-4f45-9708-019B960494DF}">
-                <a14:hiddenLine xmlns="" xmlns:a14="http://schemas.microsoft.com/office/drawing/2010/main" w="9525">
+                <a14:hiddenLine xmlns:a14="http://schemas.microsoft.com/office/drawing/2010/main" xmlns="" w="9525">
                   <a:solidFill>
                     <a:srgbClr val="000000"/>
                   </a:solidFill>
@@ -3987,7 +3987,7 @@
             </a:ln>
             <a:extLst>
               <a:ext uri="{91240B29-F687-4f45-9708-019B960494DF}">
-                <a14:hiddenLine xmlns="" xmlns:a14="http://schemas.microsoft.com/office/drawing/2010/main" w="9525">
+                <a14:hiddenLine xmlns:a14="http://schemas.microsoft.com/office/drawing/2010/main" xmlns="" w="9525">
                   <a:solidFill>
                     <a:srgbClr val="000000"/>
                   </a:solidFill>
@@ -4077,7 +4077,7 @@
             </a:ln>
             <a:extLst>
               <a:ext uri="{91240B29-F687-4f45-9708-019B960494DF}">
-                <a14:hiddenLine xmlns="" xmlns:a14="http://schemas.microsoft.com/office/drawing/2010/main" w="9525">
+                <a14:hiddenLine xmlns:a14="http://schemas.microsoft.com/office/drawing/2010/main" xmlns="" w="9525">
                   <a:solidFill>
                     <a:srgbClr val="000000"/>
                   </a:solidFill>
@@ -4167,7 +4167,7 @@
             </a:ln>
             <a:extLst>
               <a:ext uri="{91240B29-F687-4f45-9708-019B960494DF}">
-                <a14:hiddenLine xmlns="" xmlns:a14="http://schemas.microsoft.com/office/drawing/2010/main" w="9525">
+                <a14:hiddenLine xmlns:a14="http://schemas.microsoft.com/office/drawing/2010/main" xmlns="" w="9525">
                   <a:solidFill>
                     <a:srgbClr val="000000"/>
                   </a:solidFill>
@@ -4232,7 +4232,7 @@
             </a:ln>
             <a:extLst>
               <a:ext uri="{91240B29-F687-4f45-9708-019B960494DF}">
-                <a14:hiddenLine xmlns="" xmlns:a14="http://schemas.microsoft.com/office/drawing/2010/main" w="9525">
+                <a14:hiddenLine xmlns:a14="http://schemas.microsoft.com/office/drawing/2010/main" xmlns="" w="9525">
                   <a:solidFill>
                     <a:srgbClr val="000000"/>
                   </a:solidFill>
@@ -4294,7 +4294,7 @@
             </a:ln>
             <a:extLst>
               <a:ext uri="{91240B29-F687-4f45-9708-019B960494DF}">
-                <a14:hiddenLine xmlns="" xmlns:a14="http://schemas.microsoft.com/office/drawing/2010/main" w="9525">
+                <a14:hiddenLine xmlns:a14="http://schemas.microsoft.com/office/drawing/2010/main" xmlns="" w="9525">
                   <a:solidFill>
                     <a:srgbClr val="000000"/>
                   </a:solidFill>
@@ -4384,7 +4384,7 @@
             </a:ln>
             <a:extLst>
               <a:ext uri="{91240B29-F687-4f45-9708-019B960494DF}">
-                <a14:hiddenLine xmlns="" xmlns:a14="http://schemas.microsoft.com/office/drawing/2010/main" w="9525">
+                <a14:hiddenLine xmlns:a14="http://schemas.microsoft.com/office/drawing/2010/main" xmlns="" w="9525">
                   <a:solidFill>
                     <a:srgbClr val="000000"/>
                   </a:solidFill>
@@ -4474,7 +4474,7 @@
             </a:ln>
             <a:extLst>
               <a:ext uri="{91240B29-F687-4f45-9708-019B960494DF}">
-                <a14:hiddenLine xmlns="" xmlns:a14="http://schemas.microsoft.com/office/drawing/2010/main" w="9525">
+                <a14:hiddenLine xmlns:a14="http://schemas.microsoft.com/office/drawing/2010/main" xmlns="" w="9525">
                   <a:solidFill>
                     <a:srgbClr val="000000"/>
                   </a:solidFill>
@@ -4536,7 +4536,7 @@
             </a:ln>
             <a:extLst>
               <a:ext uri="{91240B29-F687-4f45-9708-019B960494DF}">
-                <a14:hiddenLine xmlns="" xmlns:a14="http://schemas.microsoft.com/office/drawing/2010/main" w="9525">
+                <a14:hiddenLine xmlns:a14="http://schemas.microsoft.com/office/drawing/2010/main" xmlns="" w="9525">
                   <a:solidFill>
                     <a:srgbClr val="000000"/>
                   </a:solidFill>
@@ -4656,7 +4656,7 @@
             </a:ln>
             <a:extLst>
               <a:ext uri="{91240B29-F687-4f45-9708-019B960494DF}">
-                <a14:hiddenLine xmlns="" xmlns:a14="http://schemas.microsoft.com/office/drawing/2010/main" w="9525">
+                <a14:hiddenLine xmlns:a14="http://schemas.microsoft.com/office/drawing/2010/main" xmlns="" w="9525">
                   <a:solidFill>
                     <a:srgbClr val="000000"/>
                   </a:solidFill>
@@ -4724,7 +4724,7 @@
             </a:ln>
             <a:extLst>
               <a:ext uri="{91240B29-F687-4f45-9708-019B960494DF}">
-                <a14:hiddenLine xmlns="" xmlns:a14="http://schemas.microsoft.com/office/drawing/2010/main" w="9525">
+                <a14:hiddenLine xmlns:a14="http://schemas.microsoft.com/office/drawing/2010/main" xmlns="" w="9525">
                   <a:solidFill>
                     <a:srgbClr val="000000"/>
                   </a:solidFill>
@@ -4814,7 +4814,7 @@
             </a:ln>
             <a:extLst>
               <a:ext uri="{91240B29-F687-4f45-9708-019B960494DF}">
-                <a14:hiddenLine xmlns="" xmlns:a14="http://schemas.microsoft.com/office/drawing/2010/main" w="9525">
+                <a14:hiddenLine xmlns:a14="http://schemas.microsoft.com/office/drawing/2010/main" xmlns="" w="9525">
                   <a:solidFill>
                     <a:srgbClr val="000000"/>
                   </a:solidFill>
@@ -4954,7 +4954,7 @@
           <a:p>
             <a:fld id="{48A87A34-81AB-432B-8DAE-1953F412C126}" type="datetimeFigureOut">
               <a:rPr lang="en-US" smtClean="0"/>
-              <a:t>11/24/2021</a:t>
+              <a:t>12/30/2021</a:t>
             </a:fld>
             <a:endParaRPr lang="en-US" dirty="0"/>
           </a:p>
@@ -5221,7 +5221,7 @@
           <a:p>
             <a:fld id="{48A87A34-81AB-432B-8DAE-1953F412C126}" type="datetimeFigureOut">
               <a:rPr lang="en-US" smtClean="0"/>
-              <a:t>11/24/2021</a:t>
+              <a:t>12/30/2021</a:t>
             </a:fld>
             <a:endParaRPr lang="en-US" dirty="0"/>
           </a:p>
@@ -5417,7 +5417,7 @@
           <a:p>
             <a:fld id="{48A87A34-81AB-432B-8DAE-1953F412C126}" type="datetimeFigureOut">
               <a:rPr lang="en-US" smtClean="0"/>
-              <a:t>11/24/2021</a:t>
+              <a:t>12/30/2021</a:t>
             </a:fld>
             <a:endParaRPr lang="en-US" dirty="0"/>
           </a:p>
@@ -5680,7 +5680,7 @@
           <a:p>
             <a:fld id="{48A87A34-81AB-432B-8DAE-1953F412C126}" type="datetimeFigureOut">
               <a:rPr lang="en-US" smtClean="0"/>
-              <a:t>11/24/2021</a:t>
+              <a:t>12/30/2021</a:t>
             </a:fld>
             <a:endParaRPr lang="en-US" dirty="0"/>
           </a:p>
@@ -6114,7 +6114,7 @@
           <a:p>
             <a:fld id="{48A87A34-81AB-432B-8DAE-1953F412C126}" type="datetimeFigureOut">
               <a:rPr lang="en-US" smtClean="0"/>
-              <a:t>11/24/2021</a:t>
+              <a:t>12/30/2021</a:t>
             </a:fld>
             <a:endParaRPr lang="en-US" dirty="0"/>
           </a:p>
@@ -6660,7 +6660,7 @@
           <a:p>
             <a:fld id="{48A87A34-81AB-432B-8DAE-1953F412C126}" type="datetimeFigureOut">
               <a:rPr lang="en-US" smtClean="0"/>
-              <a:t>11/24/2021</a:t>
+              <a:t>12/30/2021</a:t>
             </a:fld>
             <a:endParaRPr lang="en-US" dirty="0"/>
           </a:p>
@@ -7380,7 +7380,7 @@
           <a:p>
             <a:fld id="{48A87A34-81AB-432B-8DAE-1953F412C126}" type="datetimeFigureOut">
               <a:rPr lang="en-US" smtClean="0"/>
-              <a:t>11/24/2021</a:t>
+              <a:t>12/30/2021</a:t>
             </a:fld>
             <a:endParaRPr lang="en-US" dirty="0"/>
           </a:p>
@@ -7550,7 +7550,7 @@
           <a:p>
             <a:fld id="{48A87A34-81AB-432B-8DAE-1953F412C126}" type="datetimeFigureOut">
               <a:rPr lang="en-US" smtClean="0"/>
-              <a:t>11/24/2021</a:t>
+              <a:t>12/30/2021</a:t>
             </a:fld>
             <a:endParaRPr lang="en-US" dirty="0"/>
           </a:p>
@@ -7730,7 +7730,7 @@
           <a:p>
             <a:fld id="{48A87A34-81AB-432B-8DAE-1953F412C126}" type="datetimeFigureOut">
               <a:rPr lang="en-US" smtClean="0"/>
-              <a:t>11/24/2021</a:t>
+              <a:t>12/30/2021</a:t>
             </a:fld>
             <a:endParaRPr lang="en-US" dirty="0"/>
           </a:p>
@@ -7900,7 +7900,7 @@
           <a:p>
             <a:fld id="{48A87A34-81AB-432B-8DAE-1953F412C126}" type="datetimeFigureOut">
               <a:rPr lang="en-US" smtClean="0"/>
-              <a:t>11/24/2021</a:t>
+              <a:t>12/30/2021</a:t>
             </a:fld>
             <a:endParaRPr lang="en-US" dirty="0"/>
           </a:p>
@@ -8150,7 +8150,7 @@
           <a:p>
             <a:fld id="{48A87A34-81AB-432B-8DAE-1953F412C126}" type="datetimeFigureOut">
               <a:rPr lang="en-US" smtClean="0"/>
-              <a:t>11/24/2021</a:t>
+              <a:t>12/30/2021</a:t>
             </a:fld>
             <a:endParaRPr lang="en-US" dirty="0"/>
           </a:p>
@@ -8382,7 +8382,7 @@
           <a:p>
             <a:fld id="{48A87A34-81AB-432B-8DAE-1953F412C126}" type="datetimeFigureOut">
               <a:rPr lang="en-US" smtClean="0"/>
-              <a:t>11/24/2021</a:t>
+              <a:t>12/30/2021</a:t>
             </a:fld>
             <a:endParaRPr lang="en-US" dirty="0"/>
           </a:p>
@@ -8763,7 +8763,7 @@
           <a:p>
             <a:fld id="{48A87A34-81AB-432B-8DAE-1953F412C126}" type="datetimeFigureOut">
               <a:rPr lang="en-US" smtClean="0"/>
-              <a:t>11/24/2021</a:t>
+              <a:t>12/30/2021</a:t>
             </a:fld>
             <a:endParaRPr lang="en-US" dirty="0"/>
           </a:p>
@@ -8881,7 +8881,7 @@
           <a:p>
             <a:fld id="{48A87A34-81AB-432B-8DAE-1953F412C126}" type="datetimeFigureOut">
               <a:rPr lang="en-US" smtClean="0"/>
-              <a:t>11/24/2021</a:t>
+              <a:t>12/30/2021</a:t>
             </a:fld>
             <a:endParaRPr lang="en-US" dirty="0"/>
           </a:p>
@@ -8976,7 +8976,7 @@
           <a:p>
             <a:fld id="{48A87A34-81AB-432B-8DAE-1953F412C126}" type="datetimeFigureOut">
               <a:rPr lang="en-US" smtClean="0"/>
-              <a:t>11/24/2021</a:t>
+              <a:t>12/30/2021</a:t>
             </a:fld>
             <a:endParaRPr lang="en-US" dirty="0"/>
           </a:p>
@@ -9225,7 +9225,7 @@
           <a:p>
             <a:fld id="{48A87A34-81AB-432B-8DAE-1953F412C126}" type="datetimeFigureOut">
               <a:rPr lang="en-US" smtClean="0"/>
-              <a:t>11/24/2021</a:t>
+              <a:t>12/30/2021</a:t>
             </a:fld>
             <a:endParaRPr lang="en-US" dirty="0"/>
           </a:p>
@@ -9505,7 +9505,7 @@
           <a:p>
             <a:fld id="{48A87A34-81AB-432B-8DAE-1953F412C126}" type="datetimeFigureOut">
               <a:rPr lang="en-US" smtClean="0"/>
-              <a:t>11/24/2021</a:t>
+              <a:t>12/30/2021</a:t>
             </a:fld>
             <a:endParaRPr lang="en-US" dirty="0"/>
           </a:p>
@@ -9628,7 +9628,7 @@
           <a:noFill/>
           <a:extLst>
             <a:ext uri="{909E8E84-426E-40dd-AFC4-6F175D3DCCD1}">
-              <a14:hiddenFill xmlns="" xmlns:a14="http://schemas.microsoft.com/office/drawing/2010/main">
+              <a14:hiddenFill xmlns:a14="http://schemas.microsoft.com/office/drawing/2010/main" xmlns="">
                 <a:solidFill>
                   <a:srgbClr val="FFFFFF"/>
                 </a:solidFill>
@@ -9702,7 +9702,7 @@
               </a:ln>
               <a:extLst>
                 <a:ext uri="{91240B29-F687-4f45-9708-019B960494DF}">
-                  <a14:hiddenLine xmlns="" xmlns:a14="http://schemas.microsoft.com/office/drawing/2010/main" w="9525">
+                  <a14:hiddenLine xmlns:a14="http://schemas.microsoft.com/office/drawing/2010/main" xmlns="" w="9525">
                     <a:solidFill>
                       <a:srgbClr val="000000"/>
                     </a:solidFill>
@@ -9792,7 +9792,7 @@
               </a:ln>
               <a:extLst>
                 <a:ext uri="{91240B29-F687-4f45-9708-019B960494DF}">
-                  <a14:hiddenLine xmlns="" xmlns:a14="http://schemas.microsoft.com/office/drawing/2010/main" w="9525">
+                  <a14:hiddenLine xmlns:a14="http://schemas.microsoft.com/office/drawing/2010/main" xmlns="" w="9525">
                     <a:solidFill>
                       <a:srgbClr val="000000"/>
                     </a:solidFill>
@@ -9882,7 +9882,7 @@
               </a:ln>
               <a:extLst>
                 <a:ext uri="{91240B29-F687-4f45-9708-019B960494DF}">
-                  <a14:hiddenLine xmlns="" xmlns:a14="http://schemas.microsoft.com/office/drawing/2010/main" w="9525">
+                  <a14:hiddenLine xmlns:a14="http://schemas.microsoft.com/office/drawing/2010/main" xmlns="" w="9525">
                     <a:solidFill>
                       <a:srgbClr val="000000"/>
                     </a:solidFill>
@@ -9944,7 +9944,7 @@
               </a:ln>
               <a:extLst>
                 <a:ext uri="{91240B29-F687-4f45-9708-019B960494DF}">
-                  <a14:hiddenLine xmlns="" xmlns:a14="http://schemas.microsoft.com/office/drawing/2010/main" w="9525">
+                  <a14:hiddenLine xmlns:a14="http://schemas.microsoft.com/office/drawing/2010/main" xmlns="" w="9525">
                     <a:solidFill>
                       <a:srgbClr val="000000"/>
                     </a:solidFill>
@@ -10034,7 +10034,7 @@
               </a:ln>
               <a:extLst>
                 <a:ext uri="{91240B29-F687-4f45-9708-019B960494DF}">
-                  <a14:hiddenLine xmlns="" xmlns:a14="http://schemas.microsoft.com/office/drawing/2010/main" w="9525">
+                  <a14:hiddenLine xmlns:a14="http://schemas.microsoft.com/office/drawing/2010/main" xmlns="" w="9525">
                     <a:solidFill>
                       <a:srgbClr val="000000"/>
                     </a:solidFill>
@@ -10096,7 +10096,7 @@
               </a:ln>
               <a:extLst>
                 <a:ext uri="{91240B29-F687-4f45-9708-019B960494DF}">
-                  <a14:hiddenLine xmlns="" xmlns:a14="http://schemas.microsoft.com/office/drawing/2010/main" w="9525">
+                  <a14:hiddenLine xmlns:a14="http://schemas.microsoft.com/office/drawing/2010/main" xmlns="" w="9525">
                     <a:solidFill>
                       <a:srgbClr val="000000"/>
                     </a:solidFill>
@@ -10158,7 +10158,7 @@
               </a:ln>
               <a:extLst>
                 <a:ext uri="{91240B29-F687-4f45-9708-019B960494DF}">
-                  <a14:hiddenLine xmlns="" xmlns:a14="http://schemas.microsoft.com/office/drawing/2010/main" w="9525">
+                  <a14:hiddenLine xmlns:a14="http://schemas.microsoft.com/office/drawing/2010/main" xmlns="" w="9525">
                     <a:solidFill>
                       <a:srgbClr val="000000"/>
                     </a:solidFill>
@@ -10248,7 +10248,7 @@
               </a:ln>
               <a:extLst>
                 <a:ext uri="{91240B29-F687-4f45-9708-019B960494DF}">
-                  <a14:hiddenLine xmlns="" xmlns:a14="http://schemas.microsoft.com/office/drawing/2010/main" w="9525">
+                  <a14:hiddenLine xmlns:a14="http://schemas.microsoft.com/office/drawing/2010/main" xmlns="" w="9525">
                     <a:solidFill>
                       <a:srgbClr val="000000"/>
                     </a:solidFill>
@@ -10338,7 +10338,7 @@
               </a:ln>
               <a:extLst>
                 <a:ext uri="{91240B29-F687-4f45-9708-019B960494DF}">
-                  <a14:hiddenLine xmlns="" xmlns:a14="http://schemas.microsoft.com/office/drawing/2010/main" w="9525">
+                  <a14:hiddenLine xmlns:a14="http://schemas.microsoft.com/office/drawing/2010/main" xmlns="" w="9525">
                     <a:solidFill>
                       <a:srgbClr val="000000"/>
                     </a:solidFill>
@@ -10400,7 +10400,7 @@
               </a:ln>
               <a:extLst>
                 <a:ext uri="{91240B29-F687-4f45-9708-019B960494DF}">
-                  <a14:hiddenLine xmlns="" xmlns:a14="http://schemas.microsoft.com/office/drawing/2010/main" w="9525">
+                  <a14:hiddenLine xmlns:a14="http://schemas.microsoft.com/office/drawing/2010/main" xmlns="" w="9525">
                     <a:solidFill>
                       <a:srgbClr val="000000"/>
                     </a:solidFill>
@@ -10510,7 +10510,7 @@
               </a:ln>
               <a:extLst>
                 <a:ext uri="{91240B29-F687-4f45-9708-019B960494DF}">
-                  <a14:hiddenLine xmlns="" xmlns:a14="http://schemas.microsoft.com/office/drawing/2010/main" w="9525">
+                  <a14:hiddenLine xmlns:a14="http://schemas.microsoft.com/office/drawing/2010/main" xmlns="" w="9525">
                     <a:solidFill>
                       <a:srgbClr val="000000"/>
                     </a:solidFill>
@@ -10594,7 +10594,7 @@
               </a:ln>
               <a:extLst>
                 <a:ext uri="{91240B29-F687-4f45-9708-019B960494DF}">
-                  <a14:hiddenLine xmlns="" xmlns:a14="http://schemas.microsoft.com/office/drawing/2010/main" w="9525">
+                  <a14:hiddenLine xmlns:a14="http://schemas.microsoft.com/office/drawing/2010/main" xmlns="" w="9525">
                     <a:solidFill>
                       <a:srgbClr val="000000"/>
                     </a:solidFill>
@@ -10656,7 +10656,7 @@
               </a:ln>
               <a:extLst>
                 <a:ext uri="{91240B29-F687-4f45-9708-019B960494DF}">
-                  <a14:hiddenLine xmlns="" xmlns:a14="http://schemas.microsoft.com/office/drawing/2010/main" w="9525">
+                  <a14:hiddenLine xmlns:a14="http://schemas.microsoft.com/office/drawing/2010/main" xmlns="" w="9525">
                     <a:solidFill>
                       <a:srgbClr val="000000"/>
                     </a:solidFill>
@@ -10718,7 +10718,7 @@
               </a:ln>
               <a:extLst>
                 <a:ext uri="{91240B29-F687-4f45-9708-019B960494DF}">
-                  <a14:hiddenLine xmlns="" xmlns:a14="http://schemas.microsoft.com/office/drawing/2010/main" w="9525">
+                  <a14:hiddenLine xmlns:a14="http://schemas.microsoft.com/office/drawing/2010/main" xmlns="" w="9525">
                     <a:solidFill>
                       <a:srgbClr val="000000"/>
                     </a:solidFill>
@@ -10808,7 +10808,7 @@
               </a:ln>
               <a:extLst>
                 <a:ext uri="{91240B29-F687-4f45-9708-019B960494DF}">
-                  <a14:hiddenLine xmlns="" xmlns:a14="http://schemas.microsoft.com/office/drawing/2010/main" w="9525">
+                  <a14:hiddenLine xmlns:a14="http://schemas.microsoft.com/office/drawing/2010/main" xmlns="" w="9525">
                     <a:solidFill>
                       <a:srgbClr val="000000"/>
                     </a:solidFill>
@@ -10842,7 +10842,7 @@
               </a:ln>
               <a:extLst>
                 <a:ext uri="{91240B29-F687-4f45-9708-019B960494DF}">
-                  <a14:hiddenLine xmlns="" xmlns:a14="http://schemas.microsoft.com/office/drawing/2010/main" w="9525">
+                  <a14:hiddenLine xmlns:a14="http://schemas.microsoft.com/office/drawing/2010/main" xmlns="" w="9525">
                     <a:solidFill>
                       <a:srgbClr val="000000"/>
                     </a:solidFill>
@@ -10907,7 +10907,7 @@
               </a:ln>
               <a:extLst>
                 <a:ext uri="{91240B29-F687-4f45-9708-019B960494DF}">
-                  <a14:hiddenLine xmlns="" xmlns:a14="http://schemas.microsoft.com/office/drawing/2010/main" w="9525">
+                  <a14:hiddenLine xmlns:a14="http://schemas.microsoft.com/office/drawing/2010/main" xmlns="" w="9525">
                     <a:solidFill>
                       <a:srgbClr val="000000"/>
                     </a:solidFill>
@@ -10997,7 +10997,7 @@
               </a:ln>
               <a:extLst>
                 <a:ext uri="{91240B29-F687-4f45-9708-019B960494DF}">
-                  <a14:hiddenLine xmlns="" xmlns:a14="http://schemas.microsoft.com/office/drawing/2010/main" w="9525">
+                  <a14:hiddenLine xmlns:a14="http://schemas.microsoft.com/office/drawing/2010/main" xmlns="" w="9525">
                     <a:solidFill>
                       <a:srgbClr val="000000"/>
                     </a:solidFill>
@@ -11059,7 +11059,7 @@
               </a:ln>
               <a:extLst>
                 <a:ext uri="{91240B29-F687-4f45-9708-019B960494DF}">
-                  <a14:hiddenLine xmlns="" xmlns:a14="http://schemas.microsoft.com/office/drawing/2010/main" w="9525">
+                  <a14:hiddenLine xmlns:a14="http://schemas.microsoft.com/office/drawing/2010/main" xmlns="" w="9525">
                     <a:solidFill>
                       <a:srgbClr val="000000"/>
                     </a:solidFill>
@@ -11149,7 +11149,7 @@
               </a:ln>
               <a:extLst>
                 <a:ext uri="{91240B29-F687-4f45-9708-019B960494DF}">
-                  <a14:hiddenLine xmlns="" xmlns:a14="http://schemas.microsoft.com/office/drawing/2010/main" w="9525">
+                  <a14:hiddenLine xmlns:a14="http://schemas.microsoft.com/office/drawing/2010/main" xmlns="" w="9525">
                     <a:solidFill>
                       <a:srgbClr val="000000"/>
                     </a:solidFill>
@@ -11214,7 +11214,7 @@
               </a:ln>
               <a:extLst>
                 <a:ext uri="{91240B29-F687-4f45-9708-019B960494DF}">
-                  <a14:hiddenLine xmlns="" xmlns:a14="http://schemas.microsoft.com/office/drawing/2010/main" w="9525">
+                  <a14:hiddenLine xmlns:a14="http://schemas.microsoft.com/office/drawing/2010/main" xmlns="" w="9525">
                     <a:solidFill>
                       <a:srgbClr val="000000"/>
                     </a:solidFill>
@@ -11276,7 +11276,7 @@
               </a:ln>
               <a:extLst>
                 <a:ext uri="{91240B29-F687-4f45-9708-019B960494DF}">
-                  <a14:hiddenLine xmlns="" xmlns:a14="http://schemas.microsoft.com/office/drawing/2010/main" w="9525">
+                  <a14:hiddenLine xmlns:a14="http://schemas.microsoft.com/office/drawing/2010/main" xmlns="" w="9525">
                     <a:solidFill>
                       <a:srgbClr val="000000"/>
                     </a:solidFill>
@@ -11366,7 +11366,7 @@
               </a:ln>
               <a:extLst>
                 <a:ext uri="{91240B29-F687-4f45-9708-019B960494DF}">
-                  <a14:hiddenLine xmlns="" xmlns:a14="http://schemas.microsoft.com/office/drawing/2010/main" w="9525">
+                  <a14:hiddenLine xmlns:a14="http://schemas.microsoft.com/office/drawing/2010/main" xmlns="" w="9525">
                     <a:solidFill>
                       <a:srgbClr val="000000"/>
                     </a:solidFill>
@@ -11456,7 +11456,7 @@
               </a:ln>
               <a:extLst>
                 <a:ext uri="{91240B29-F687-4f45-9708-019B960494DF}">
-                  <a14:hiddenLine xmlns="" xmlns:a14="http://schemas.microsoft.com/office/drawing/2010/main" w="9525">
+                  <a14:hiddenLine xmlns:a14="http://schemas.microsoft.com/office/drawing/2010/main" xmlns="" w="9525">
                     <a:solidFill>
                       <a:srgbClr val="000000"/>
                     </a:solidFill>
@@ -11521,7 +11521,7 @@
               </a:ln>
               <a:extLst>
                 <a:ext uri="{91240B29-F687-4f45-9708-019B960494DF}">
-                  <a14:hiddenLine xmlns="" xmlns:a14="http://schemas.microsoft.com/office/drawing/2010/main" w="9525">
+                  <a14:hiddenLine xmlns:a14="http://schemas.microsoft.com/office/drawing/2010/main" xmlns="" w="9525">
                     <a:solidFill>
                       <a:srgbClr val="000000"/>
                     </a:solidFill>
@@ -11641,7 +11641,7 @@
               </a:ln>
               <a:extLst>
                 <a:ext uri="{91240B29-F687-4f45-9708-019B960494DF}">
-                  <a14:hiddenLine xmlns="" xmlns:a14="http://schemas.microsoft.com/office/drawing/2010/main" w="9525">
+                  <a14:hiddenLine xmlns:a14="http://schemas.microsoft.com/office/drawing/2010/main" xmlns="" w="9525">
                     <a:solidFill>
                       <a:srgbClr val="000000"/>
                     </a:solidFill>
@@ -11722,7 +11722,7 @@
               </a:ln>
               <a:extLst>
                 <a:ext uri="{91240B29-F687-4f45-9708-019B960494DF}">
-                  <a14:hiddenLine xmlns="" xmlns:a14="http://schemas.microsoft.com/office/drawing/2010/main" w="9525">
+                  <a14:hiddenLine xmlns:a14="http://schemas.microsoft.com/office/drawing/2010/main" xmlns="" w="9525">
                     <a:solidFill>
                       <a:srgbClr val="000000"/>
                     </a:solidFill>
@@ -11837,7 +11837,7 @@
               </a:ln>
               <a:extLst>
                 <a:ext uri="{91240B29-F687-4f45-9708-019B960494DF}">
-                  <a14:hiddenLine xmlns="" xmlns:a14="http://schemas.microsoft.com/office/drawing/2010/main" w="9525">
+                  <a14:hiddenLine xmlns:a14="http://schemas.microsoft.com/office/drawing/2010/main" xmlns="" w="9525">
                     <a:solidFill>
                       <a:srgbClr val="000000"/>
                     </a:solidFill>
@@ -11927,7 +11927,7 @@
               </a:ln>
               <a:extLst>
                 <a:ext uri="{91240B29-F687-4f45-9708-019B960494DF}">
-                  <a14:hiddenLine xmlns="" xmlns:a14="http://schemas.microsoft.com/office/drawing/2010/main" w="9525">
+                  <a14:hiddenLine xmlns:a14="http://schemas.microsoft.com/office/drawing/2010/main" xmlns="" w="9525">
                     <a:solidFill>
                       <a:srgbClr val="000000"/>
                     </a:solidFill>
@@ -11992,7 +11992,7 @@
               </a:ln>
               <a:extLst>
                 <a:ext uri="{91240B29-F687-4f45-9708-019B960494DF}">
-                  <a14:hiddenLine xmlns="" xmlns:a14="http://schemas.microsoft.com/office/drawing/2010/main" w="9525">
+                  <a14:hiddenLine xmlns:a14="http://schemas.microsoft.com/office/drawing/2010/main" xmlns="" w="9525">
                     <a:solidFill>
                       <a:srgbClr val="000000"/>
                     </a:solidFill>
@@ -12082,7 +12082,7 @@
               </a:ln>
               <a:extLst>
                 <a:ext uri="{91240B29-F687-4f45-9708-019B960494DF}">
-                  <a14:hiddenLine xmlns="" xmlns:a14="http://schemas.microsoft.com/office/drawing/2010/main" w="9525">
+                  <a14:hiddenLine xmlns:a14="http://schemas.microsoft.com/office/drawing/2010/main" xmlns="" w="9525">
                     <a:solidFill>
                       <a:srgbClr val="000000"/>
                     </a:solidFill>
@@ -12150,7 +12150,7 @@
               </a:ln>
               <a:extLst>
                 <a:ext uri="{91240B29-F687-4f45-9708-019B960494DF}">
-                  <a14:hiddenLine xmlns="" xmlns:a14="http://schemas.microsoft.com/office/drawing/2010/main" w="9525">
+                  <a14:hiddenLine xmlns:a14="http://schemas.microsoft.com/office/drawing/2010/main" xmlns="" w="9525">
                     <a:solidFill>
                       <a:srgbClr val="000000"/>
                     </a:solidFill>
@@ -12240,7 +12240,7 @@
               </a:ln>
               <a:extLst>
                 <a:ext uri="{91240B29-F687-4f45-9708-019B960494DF}">
-                  <a14:hiddenLine xmlns="" xmlns:a14="http://schemas.microsoft.com/office/drawing/2010/main" w="9525">
+                  <a14:hiddenLine xmlns:a14="http://schemas.microsoft.com/office/drawing/2010/main" xmlns="" w="9525">
                     <a:solidFill>
                       <a:srgbClr val="000000"/>
                     </a:solidFill>
@@ -12308,7 +12308,7 @@
               </a:ln>
               <a:extLst>
                 <a:ext uri="{91240B29-F687-4f45-9708-019B960494DF}">
-                  <a14:hiddenLine xmlns="" xmlns:a14="http://schemas.microsoft.com/office/drawing/2010/main" w="9525">
+                  <a14:hiddenLine xmlns:a14="http://schemas.microsoft.com/office/drawing/2010/main" xmlns="" w="9525">
                     <a:solidFill>
                       <a:srgbClr val="000000"/>
                     </a:solidFill>
@@ -12398,7 +12398,7 @@
               </a:ln>
               <a:extLst>
                 <a:ext uri="{91240B29-F687-4f45-9708-019B960494DF}">
-                  <a14:hiddenLine xmlns="" xmlns:a14="http://schemas.microsoft.com/office/drawing/2010/main" w="9525">
+                  <a14:hiddenLine xmlns:a14="http://schemas.microsoft.com/office/drawing/2010/main" xmlns="" w="9525">
                     <a:solidFill>
                       <a:srgbClr val="000000"/>
                     </a:solidFill>
@@ -12432,7 +12432,7 @@
               </a:ln>
               <a:extLst>
                 <a:ext uri="{91240B29-F687-4f45-9708-019B960494DF}">
-                  <a14:hiddenLine xmlns="" xmlns:a14="http://schemas.microsoft.com/office/drawing/2010/main" w="9525">
+                  <a14:hiddenLine xmlns:a14="http://schemas.microsoft.com/office/drawing/2010/main" xmlns="" w="9525">
                     <a:solidFill>
                       <a:srgbClr val="000000"/>
                     </a:solidFill>
@@ -12573,7 +12573,7 @@
             <a:fld id="{48A87A34-81AB-432B-8DAE-1953F412C126}" type="datetimeFigureOut">
               <a:rPr lang="en-US" smtClean="0"/>
               <a:pPr/>
-              <a:t>11/24/2021</a:t>
+              <a:t>12/30/2021</a:t>
             </a:fld>
             <a:endParaRPr lang="en-US" dirty="0"/>
           </a:p>
@@ -13054,7 +13054,7 @@
         </p:spPr>
         <p:txBody>
           <a:bodyPr>
-            <a:normAutofit/>
+            <a:normAutofit fontScale="92500" lnSpcReduction="20000"/>
           </a:bodyPr>
           <a:lstStyle/>
           <a:p>
@@ -13074,6 +13074,22 @@
                 <a:cs typeface="Tahoma" panose="020B0604030504040204" pitchFamily="34" charset="0"/>
               </a:rPr>
               <a:t>NetBEans</a:t>
+            </a:r>
+            <a:endParaRPr lang="en-US" sz="2400" dirty="0" smtClean="0">
+              <a:latin typeface="Tahoma" panose="020B0604030504040204" pitchFamily="34" charset="0"/>
+              <a:ea typeface="Tahoma" panose="020B0604030504040204" pitchFamily="34" charset="0"/>
+              <a:cs typeface="Tahoma" panose="020B0604030504040204" pitchFamily="34" charset="0"/>
+            </a:endParaRPr>
+          </a:p>
+          <a:p>
+            <a:pPr algn="r"/>
+            <a:r>
+              <a:rPr lang="en-US" sz="2400" dirty="0" smtClean="0">
+                <a:latin typeface="Tahoma" panose="020B0604030504040204" pitchFamily="34" charset="0"/>
+                <a:ea typeface="Tahoma" panose="020B0604030504040204" pitchFamily="34" charset="0"/>
+                <a:cs typeface="Tahoma" panose="020B0604030504040204" pitchFamily="34" charset="0"/>
+              </a:rPr>
+              <a:t>By Bijay shrestha (BscCsit/074/11)</a:t>
             </a:r>
             <a:endParaRPr lang="en-US" sz="2400" dirty="0">
               <a:latin typeface="Tahoma" panose="020B0604030504040204" pitchFamily="34" charset="0"/>
@@ -15752,6 +15768,14 @@
 </file>
 
 <file path=customXml/item2.xml><?xml version="1.0" encoding="utf-8"?>
+<p:properties xmlns:p="http://schemas.microsoft.com/office/2006/metadata/properties" xmlns:xsi="http://www.w3.org/2001/XMLSchema-instance" xmlns:pc="http://schemas.microsoft.com/office/infopath/2007/PartnerControls">
+  <documentManagement>
+    <MediaServiceKeyPoints xmlns="71af3243-3dd4-4a8d-8c0d-dd76da1f02a5" xsi:nil="true"/>
+  </documentManagement>
+</p:properties>
+</file>
+
+<file path=customXml/item3.xml><?xml version="1.0" encoding="utf-8"?>
 <ct:contentTypeSchema xmlns:ct="http://schemas.microsoft.com/office/2006/metadata/contentType" xmlns:ma="http://schemas.microsoft.com/office/2006/metadata/properties/metaAttributes" ct:_="" ma:_="" ma:contentTypeName="Document" ma:contentTypeID="0x01010079F111ED35F8CC479449609E8A0923A6" ma:contentTypeVersion="11" ma:contentTypeDescription="Create a new document." ma:contentTypeScope="" ma:versionID="96291512c1ee715ab617f4c07df79fc1">
   <xsd:schema xmlns:xsd="http://www.w3.org/2001/XMLSchema" xmlns:xs="http://www.w3.org/2001/XMLSchema" xmlns:p="http://schemas.microsoft.com/office/2006/metadata/properties" xmlns:ns2="71af3243-3dd4-4a8d-8c0d-dd76da1f02a5" xmlns:ns3="16c05727-aa75-4e4a-9b5f-8a80a1165891" targetNamespace="http://schemas.microsoft.com/office/2006/metadata/properties" ma:root="true" ma:fieldsID="8256c27c40ca5c40ce1cf6c44f0205df" ns2:_="" ns3:_="">
     <xsd:import namespace="71af3243-3dd4-4a8d-8c0d-dd76da1f02a5"/>
@@ -15962,14 +15986,6 @@
 </ct:contentTypeSchema>
 </file>
 
-<file path=customXml/item3.xml><?xml version="1.0" encoding="utf-8"?>
-<p:properties xmlns:p="http://schemas.microsoft.com/office/2006/metadata/properties" xmlns:xsi="http://www.w3.org/2001/XMLSchema-instance" xmlns:pc="http://schemas.microsoft.com/office/infopath/2007/PartnerControls">
-  <documentManagement>
-    <MediaServiceKeyPoints xmlns="71af3243-3dd4-4a8d-8c0d-dd76da1f02a5" xsi:nil="true"/>
-  </documentManagement>
-</p:properties>
-</file>
-
 <file path=customXml/itemProps1.xml><?xml version="1.0" encoding="utf-8"?>
 <ds:datastoreItem xmlns:ds="http://schemas.openxmlformats.org/officeDocument/2006/customXml" ds:itemID="{B579702B-25C7-40D7-9E29-7686B11A9660}">
   <ds:schemaRefs>
@@ -15979,6 +15995,16 @@
 </file>
 
 <file path=customXml/itemProps2.xml><?xml version="1.0" encoding="utf-8"?>
+<ds:datastoreItem xmlns:ds="http://schemas.openxmlformats.org/officeDocument/2006/customXml" ds:itemID="{E7866CFD-F94E-4AE5-ACEA-86FEC0F48A10}">
+  <ds:schemaRefs>
+    <ds:schemaRef ds:uri="http://schemas.microsoft.com/office/2006/metadata/properties"/>
+    <ds:schemaRef ds:uri="http://schemas.microsoft.com/office/infopath/2007/PartnerControls"/>
+    <ds:schemaRef ds:uri="71af3243-3dd4-4a8d-8c0d-dd76da1f02a5"/>
+  </ds:schemaRefs>
+</ds:datastoreItem>
+</file>
+
+<file path=customXml/itemProps3.xml><?xml version="1.0" encoding="utf-8"?>
 <ds:datastoreItem xmlns:ds="http://schemas.openxmlformats.org/officeDocument/2006/customXml" ds:itemID="{A7C0B241-13E5-418D-8920-D23491E2D2C0}">
   <ds:schemaRefs>
     <ds:schemaRef ds:uri="http://schemas.microsoft.com/office/2006/metadata/contentType"/>
@@ -15995,14 +16021,4 @@
     <ds:schemaRef ds:uri="http://schemas.microsoft.com/internal/obd"/>
   </ds:schemaRefs>
 </ds:datastoreItem>
-</file>
-
-<file path=customXml/itemProps3.xml><?xml version="1.0" encoding="utf-8"?>
-<ds:datastoreItem xmlns:ds="http://schemas.openxmlformats.org/officeDocument/2006/customXml" ds:itemID="{E7866CFD-F94E-4AE5-ACEA-86FEC0F48A10}">
-  <ds:schemaRefs>
-    <ds:schemaRef ds:uri="http://schemas.microsoft.com/office/2006/metadata/properties"/>
-    <ds:schemaRef ds:uri="http://schemas.microsoft.com/office/infopath/2007/PartnerControls"/>
-    <ds:schemaRef ds:uri="71af3243-3dd4-4a8d-8c0d-dd76da1f02a5"/>
-  </ds:schemaRefs>
-</ds:datastoreItem>
 </file>
</xml_diff>